<commit_message>
Add tutorial 2 slides
</commit_message>
<xml_diff>
--- a/Tutorial 1/Tutorial 1 - Introduction.pptx
+++ b/Tutorial 1/Tutorial 1 - Introduction.pptx
@@ -3866,6 +3866,15 @@
               <a:t>AY18/19 – week 3</a:t>
             </a:r>
           </a:p>
+          <a:p>
+            <a:r>
+              <a:rPr lang="en-MY"/>
+              <a:t>Andrew Tan</a:t>
+            </a:r>
+          </a:p>
+          <a:p>
+            <a:endParaRPr lang="en-MY" dirty="0"/>
+          </a:p>
         </p:txBody>
       </p:sp>
     </p:spTree>

</xml_diff>